<commit_message>
Aula T2-S01 e T2-S02, updates de código
</commit_message>
<xml_diff>
--- a/aulas/t/SCO-T0-INT.pptx
+++ b/aulas/t/SCO-T0-INT.pptx
@@ -5212,7 +5212,7 @@
         </p:nvSpPr>
         <p:spPr bwMode="auto">
           <a:xfrm>
-            <a:off x="540000" y="900000"/>
+            <a:off x="540000" y="841276"/>
             <a:ext cx="8164059" cy="2579668"/>
           </a:xfrm>
           <a:prstGeom prst="rect">
@@ -5613,7 +5613,7 @@
         </p:nvSpPr>
         <p:spPr bwMode="auto">
           <a:xfrm>
-            <a:off x="540000" y="900000"/>
+            <a:off x="540000" y="841276"/>
             <a:ext cx="8233871" cy="3049413"/>
           </a:xfrm>
           <a:prstGeom prst="rect">
@@ -6013,7 +6013,7 @@
         </p:nvSpPr>
         <p:spPr bwMode="auto">
           <a:xfrm>
-            <a:off x="540000" y="900000"/>
+            <a:off x="540000" y="841276"/>
             <a:ext cx="8233871" cy="2458482"/>
           </a:xfrm>
           <a:prstGeom prst="rect">
@@ -6403,7 +6403,7 @@
         <p:spPr bwMode="auto">
           <a:xfrm>
             <a:off x="540000" y="900000"/>
-            <a:ext cx="8179865" cy="2033751"/>
+            <a:ext cx="8179865" cy="2994014"/>
           </a:xfrm>
           <a:prstGeom prst="rect">
             <a:avLst/>
@@ -6500,6 +6500,62 @@
               <a:rPr lang="pt-PT" sz="1600" b="0" i="0" dirty="0"/>
               <a:t>Atendimento a definir com o docente responsável por cada turma.</a:t>
             </a:r>
+          </a:p>
+          <a:p>
+            <a:pPr marL="238887" indent="-238887" algn="l" defTabSz="704085">
+              <a:lnSpc>
+                <a:spcPct val="120000"/>
+              </a:lnSpc>
+              <a:buFont typeface="Wingdings" pitchFamily="2" charset="2"/>
+              <a:buChar char="Ø"/>
+            </a:pPr>
+            <a:endParaRPr lang="pt-PT" sz="2000" b="0" i="0" dirty="0"/>
+          </a:p>
+          <a:p>
+            <a:pPr marL="238887" indent="-238887" algn="l" defTabSz="704085">
+              <a:lnSpc>
+                <a:spcPct val="120000"/>
+              </a:lnSpc>
+              <a:buFont typeface="Wingdings" pitchFamily="2" charset="2"/>
+              <a:buChar char="Ø"/>
+            </a:pPr>
+            <a:r>
+              <a:rPr lang="pt-PT" sz="2000" b="0" i="0" dirty="0"/>
+              <a:t>Recursos:</a:t>
+            </a:r>
+          </a:p>
+          <a:p>
+            <a:pPr marL="632838" lvl="1" indent="-236093" algn="l" defTabSz="704085">
+              <a:lnSpc>
+                <a:spcPct val="120000"/>
+              </a:lnSpc>
+              <a:buFont typeface="Wingdings" pitchFamily="2" charset="2"/>
+              <a:buChar char="Ø"/>
+            </a:pPr>
+            <a:r>
+              <a:rPr lang="pt-PT" sz="1600" b="0" i="0" dirty="0"/>
+              <a:t>Repositório GIT em: </a:t>
+            </a:r>
+            <a:r>
+              <a:rPr lang="pt-PT" sz="1600" b="0" i="0" dirty="0">
+                <a:solidFill>
+                  <a:schemeClr val="accent2"/>
+                </a:solidFill>
+                <a:hlinkClick r:id="rId3">
+                  <a:extLst>
+                    <a:ext uri="{A12FA001-AC4F-418D-AE19-62706E023703}">
+                      <ahyp:hlinkClr xmlns:ahyp="http://schemas.microsoft.com/office/drawing/2018/hyperlinkcolor" val="tx"/>
+                    </a:ext>
+                  </a:extLst>
+                </a:hlinkClick>
+              </a:rPr>
+              <a:t>https://github.com/fsp864/UTAD-SOP.git</a:t>
+            </a:r>
+            <a:endParaRPr lang="pt-PT" sz="1600" b="0" i="0" dirty="0">
+              <a:solidFill>
+                <a:schemeClr val="accent2"/>
+              </a:solidFill>
+            </a:endParaRPr>
           </a:p>
         </p:txBody>
       </p:sp>
@@ -7186,8 +7242,8 @@
         </p:nvSpPr>
         <p:spPr bwMode="auto">
           <a:xfrm>
-            <a:off x="540000" y="900000"/>
-            <a:ext cx="8064448" cy="1921988"/>
+            <a:off x="540000" y="841276"/>
+            <a:ext cx="8064448" cy="1305473"/>
           </a:xfrm>
           <a:prstGeom prst="rect">
             <a:avLst/>
@@ -7246,7 +7302,7 @@
             </a:r>
             <a:r>
               <a:rPr lang="pt-PT" sz="1600" b="0" i="0" dirty="0"/>
-              <a:t> para mais pormenores. </a:t>
+              <a:t> para mais pormenores; </a:t>
             </a:r>
           </a:p>
           <a:p>
@@ -7260,40 +7316,9 @@
               <a:buFont typeface="Wingdings" pitchFamily="2" charset="2"/>
               <a:buChar char="Ø"/>
             </a:pPr>
-            <a:endParaRPr lang="pt-PT" sz="1600" b="0" i="0" dirty="0"/>
-          </a:p>
-          <a:p>
-            <a:pPr marL="490347" lvl="1" indent="-212979" algn="just" defTabSz="624078">
-              <a:lnSpc>
-                <a:spcPct val="110000"/>
-              </a:lnSpc>
-              <a:spcAft>
-                <a:spcPct val="10000"/>
-              </a:spcAft>
-              <a:buFont typeface="Wingdings" pitchFamily="2" charset="2"/>
-              <a:buChar char="Ø"/>
-            </a:pPr>
             <a:r>
               <a:rPr lang="pt-PT" sz="1600" b="0" i="0" dirty="0"/>
-              <a:t>Esta apresentação está disponível em:</a:t>
-            </a:r>
-          </a:p>
-          <a:p>
-            <a:pPr marL="633984" lvl="2" indent="-3715" algn="just" defTabSz="624078">
-              <a:lnSpc>
-                <a:spcPct val="110000"/>
-              </a:lnSpc>
-              <a:spcAft>
-                <a:spcPct val="10000"/>
-              </a:spcAft>
-            </a:pPr>
-            <a:r>
-              <a:rPr lang="pt-PT" sz="1600" b="0" i="0" dirty="0" err="1"/>
-              <a:t>SiDE</a:t>
-            </a:r>
-            <a:r>
-              <a:rPr lang="pt-PT" sz="1600" b="0" i="0" dirty="0"/>
-              <a:t>: http://side.utad.pt/*/SCO-T0-INT.zip</a:t>
+              <a:t>Esta apresentação está disponível no repositório.</a:t>
             </a:r>
           </a:p>
         </p:txBody>
@@ -7566,7 +7591,7 @@
         </p:nvSpPr>
         <p:spPr bwMode="auto">
           <a:xfrm>
-            <a:off x="540000" y="900000"/>
+            <a:off x="540000" y="841276"/>
             <a:ext cx="8280920" cy="2099537"/>
           </a:xfrm>
           <a:prstGeom prst="rect">
@@ -7932,7 +7957,7 @@
         </p:nvSpPr>
         <p:spPr bwMode="auto">
           <a:xfrm>
-            <a:off x="540000" y="900000"/>
+            <a:off x="540000" y="841276"/>
             <a:ext cx="8496496" cy="4545208"/>
           </a:xfrm>
           <a:prstGeom prst="rect">
@@ -8266,7 +8291,7 @@
         </p:nvSpPr>
         <p:spPr bwMode="auto">
           <a:xfrm>
-            <a:off x="540000" y="900000"/>
+            <a:off x="540000" y="841276"/>
             <a:ext cx="8496496" cy="1122924"/>
           </a:xfrm>
           <a:prstGeom prst="rect">
@@ -8662,7 +8687,7 @@
         </p:nvSpPr>
         <p:spPr bwMode="auto">
           <a:xfrm>
-            <a:off x="540000" y="900000"/>
+            <a:off x="540000" y="841276"/>
             <a:ext cx="8352480" cy="1122924"/>
           </a:xfrm>
           <a:prstGeom prst="rect">
@@ -10674,7 +10699,7 @@
         </p:nvSpPr>
         <p:spPr bwMode="auto">
           <a:xfrm>
-            <a:off x="540000" y="900000"/>
+            <a:off x="540000" y="841276"/>
             <a:ext cx="8233871" cy="3806544"/>
           </a:xfrm>
           <a:prstGeom prst="rect">
@@ -11083,7 +11108,7 @@
         </p:nvSpPr>
         <p:spPr bwMode="auto">
           <a:xfrm>
-            <a:off x="540000" y="900000"/>
+            <a:off x="540000" y="841276"/>
             <a:ext cx="8233871" cy="4249742"/>
           </a:xfrm>
           <a:prstGeom prst="rect">
@@ -11566,7 +11591,7 @@
         </p:nvSpPr>
         <p:spPr bwMode="auto">
           <a:xfrm>
-            <a:off x="540000" y="900000"/>
+            <a:off x="540000" y="841276"/>
             <a:ext cx="8233871" cy="4175876"/>
           </a:xfrm>
           <a:prstGeom prst="rect">

</xml_diff>

<commit_message>
updates T0-INT e P02S2
</commit_message>
<xml_diff>
--- a/aulas/t/SCO-T0-INT.pptx
+++ b/aulas/t/SCO-T0-INT.pptx
@@ -6182,8 +6182,8 @@
         </p:nvSpPr>
         <p:spPr bwMode="auto">
           <a:xfrm>
-            <a:off x="3006330" y="217207"/>
-            <a:ext cx="5292085" cy="420439"/>
+            <a:off x="2843808" y="217207"/>
+            <a:ext cx="5454607" cy="420439"/>
           </a:xfrm>
           <a:prstGeom prst="rect">
             <a:avLst/>
@@ -6228,7 +6228,7 @@
                 </a:solidFill>
                 <a:latin typeface="Arial" charset="0"/>
               </a:rPr>
-              <a:t>Atendimento e Turmas Práticas</a:t>
+              <a:t>Atendimento, Turmas Práticas e Recursos</a:t>
             </a:r>
           </a:p>
         </p:txBody>
@@ -9957,22 +9957,13 @@
               </a:rPr>
             </a:br>
             <a:r>
-              <a:rPr lang="pt-PT" sz="2000" b="1" i="1" cap="small" dirty="0" err="1">
-                <a:solidFill>
-                  <a:srgbClr val="FF0000"/>
-                </a:solidFill>
-                <a:latin typeface="Arial" charset="0"/>
-              </a:rPr>
-              <a:t>MÉtodo</a:t>
-            </a:r>
-            <a:r>
               <a:rPr lang="pt-PT" sz="2000" b="1" i="1" cap="small" dirty="0">
                 <a:solidFill>
                   <a:srgbClr val="FF0000"/>
                 </a:solidFill>
                 <a:latin typeface="Arial" charset="0"/>
               </a:rPr>
-              <a:t> Avaliação</a:t>
+              <a:t>Método Avaliação</a:t>
             </a:r>
             <a:endParaRPr lang="pt-PT" sz="2000" b="1" i="1" dirty="0">
               <a:solidFill>
@@ -10348,22 +10339,13 @@
               </a:rPr>
             </a:br>
             <a:r>
-              <a:rPr lang="pt-PT" sz="2000" b="1" i="1" cap="small" dirty="0" err="1">
-                <a:solidFill>
-                  <a:srgbClr val="FF0000"/>
-                </a:solidFill>
-                <a:latin typeface="Arial" charset="0"/>
-              </a:rPr>
-              <a:t>MÉtodo</a:t>
-            </a:r>
-            <a:r>
               <a:rPr lang="pt-PT" sz="2000" b="1" i="1" cap="small" dirty="0">
                 <a:solidFill>
                   <a:srgbClr val="FF0000"/>
                 </a:solidFill>
                 <a:latin typeface="Arial" charset="0"/>
               </a:rPr>
-              <a:t> Avaliação</a:t>
+              <a:t>Método Avaliação</a:t>
             </a:r>
             <a:endParaRPr lang="pt-PT" sz="2000" b="1" i="1" dirty="0">
               <a:solidFill>
@@ -10385,7 +10367,7 @@
         <p:spPr bwMode="auto">
           <a:xfrm>
             <a:off x="540000" y="841276"/>
-            <a:ext cx="8233871" cy="1295087"/>
+            <a:ext cx="8233871" cy="4028143"/>
           </a:xfrm>
           <a:prstGeom prst="rect">
             <a:avLst/>
@@ -10414,7 +10396,7 @@
             </a:pPr>
             <a:r>
               <a:rPr lang="pt-PT" sz="2000" b="0" i="0" dirty="0"/>
-              <a:t>Acesso a Exame / Recurso </a:t>
+              <a:t>Complementar</a:t>
             </a:r>
           </a:p>
           <a:p>
@@ -10427,7 +10409,7 @@
             </a:pPr>
             <a:r>
               <a:rPr lang="pt-PT" sz="1600" b="0" i="0" dirty="0"/>
-              <a:t>Mínimo de 5 valores numa das PIA (Prova Intermédia de Avaliação) ou PFA (Prova Final de Avaliação);</a:t>
+              <a:t>Mínimo de 9,5 valores em 50% das componentes;</a:t>
             </a:r>
           </a:p>
           <a:p>
@@ -10440,7 +10422,124 @@
             </a:pPr>
             <a:r>
               <a:rPr lang="pt-PT" sz="1600" b="0" i="0" dirty="0"/>
-              <a:t>Faltar à uma da PIA ou PFA, ou desistir invalida mínimos de acesso.</a:t>
+              <a:t>Componentes:</a:t>
+            </a:r>
+          </a:p>
+          <a:p>
+            <a:pPr marL="760348" lvl="2" indent="-251459" algn="just" defTabSz="704085">
+              <a:lnSpc>
+                <a:spcPct val="120000"/>
+              </a:lnSpc>
+              <a:buFont typeface="Arial" pitchFamily="34" charset="0"/>
+              <a:buChar char="•"/>
+            </a:pPr>
+            <a:r>
+              <a:rPr lang="pt-PT" sz="1600" b="0" i="0" dirty="0"/>
+              <a:t>25% Teórica / Parte 1;</a:t>
+            </a:r>
+          </a:p>
+          <a:p>
+            <a:pPr marL="760348" lvl="2" indent="-251459" algn="just" defTabSz="704085">
+              <a:lnSpc>
+                <a:spcPct val="120000"/>
+              </a:lnSpc>
+              <a:buFont typeface="Arial" pitchFamily="34" charset="0"/>
+              <a:buChar char="•"/>
+            </a:pPr>
+            <a:r>
+              <a:rPr lang="pt-PT" sz="1600" b="0" i="0" dirty="0"/>
+              <a:t>25% Prática / Parte 1;</a:t>
+            </a:r>
+          </a:p>
+          <a:p>
+            <a:pPr marL="760348" lvl="2" indent="-251459" algn="just" defTabSz="704085">
+              <a:lnSpc>
+                <a:spcPct val="120000"/>
+              </a:lnSpc>
+              <a:buFont typeface="Arial" pitchFamily="34" charset="0"/>
+              <a:buChar char="•"/>
+            </a:pPr>
+            <a:r>
+              <a:rPr lang="pt-PT" sz="1600" b="0" i="0" dirty="0"/>
+              <a:t>25% Teórica / Parte 2;</a:t>
+            </a:r>
+          </a:p>
+          <a:p>
+            <a:pPr marL="760348" lvl="2" indent="-251459" algn="just" defTabSz="704085">
+              <a:lnSpc>
+                <a:spcPct val="120000"/>
+              </a:lnSpc>
+              <a:buFont typeface="Arial" pitchFamily="34" charset="0"/>
+              <a:buChar char="•"/>
+            </a:pPr>
+            <a:r>
+              <a:rPr lang="pt-PT" sz="1600" b="0" i="0" dirty="0"/>
+              <a:t>25% Prática / Parte 2;</a:t>
+            </a:r>
+          </a:p>
+          <a:p>
+            <a:pPr marL="403732" lvl="1" indent="-251459" algn="just" defTabSz="704085">
+              <a:lnSpc>
+                <a:spcPct val="120000"/>
+              </a:lnSpc>
+              <a:buFont typeface="Arial" pitchFamily="34" charset="0"/>
+              <a:buChar char="•"/>
+            </a:pPr>
+            <a:r>
+              <a:rPr lang="pt-PT" sz="1600" b="0" i="0" dirty="0"/>
+              <a:t>Mínimo 2 componentes (5’%), máximo 3 componentes (75%);</a:t>
+            </a:r>
+          </a:p>
+          <a:p>
+            <a:pPr marL="403732" lvl="1" indent="-251459" algn="just" defTabSz="704085">
+              <a:lnSpc>
+                <a:spcPct val="120000"/>
+              </a:lnSpc>
+              <a:buFont typeface="Arial" pitchFamily="34" charset="0"/>
+              <a:buChar char="•"/>
+            </a:pPr>
+            <a:r>
+              <a:rPr lang="pt-PT" sz="1600" b="0" i="0" dirty="0"/>
+              <a:t>Pode ser qualquer combinação de componentes.</a:t>
+            </a:r>
+          </a:p>
+          <a:p>
+            <a:pPr marL="238887" indent="-238887" algn="l" defTabSz="704085">
+              <a:lnSpc>
+                <a:spcPct val="120000"/>
+              </a:lnSpc>
+              <a:buFont typeface="Wingdings" pitchFamily="2" charset="2"/>
+              <a:buChar char="Ø"/>
+            </a:pPr>
+            <a:r>
+              <a:rPr lang="pt-PT" sz="2000" b="0" i="0" dirty="0"/>
+              <a:t>Acesso a Exame / Recurso </a:t>
+            </a:r>
+          </a:p>
+          <a:p>
+            <a:pPr marL="403732" lvl="1" indent="-251459" algn="just" defTabSz="704085">
+              <a:lnSpc>
+                <a:spcPct val="120000"/>
+              </a:lnSpc>
+              <a:buFont typeface="Arial" pitchFamily="34" charset="0"/>
+              <a:buChar char="•"/>
+            </a:pPr>
+            <a:r>
+              <a:rPr lang="pt-PT" sz="1600" b="0" i="0" dirty="0"/>
+              <a:t>Mínimo de 5 valores numa das PIA (Prova Intermédia de Avaliação) ou PFA (Prova Final de Avaliação);</a:t>
+            </a:r>
+          </a:p>
+          <a:p>
+            <a:pPr marL="403732" lvl="1" indent="-251459" algn="just" defTabSz="704085">
+              <a:lnSpc>
+                <a:spcPct val="120000"/>
+              </a:lnSpc>
+              <a:buFont typeface="Arial" pitchFamily="34" charset="0"/>
+              <a:buChar char="•"/>
+            </a:pPr>
+            <a:r>
+              <a:rPr lang="pt-PT" sz="1600" b="0" i="0" dirty="0"/>
+              <a:t>Faltar à uma da PIA ou PFA, ou desistir numa, elemina mínimos de acesso.</a:t>
             </a:r>
           </a:p>
         </p:txBody>

</xml_diff>